<commit_message>
working fine so far
</commit_message>
<xml_diff>
--- a/figs/conceptual_approach.pptx
+++ b/figs/conceptual_approach.pptx
@@ -6,6 +6,7 @@
   </p:sldMasterIdLst>
   <p:sldIdLst>
     <p:sldId id="256" r:id="rId2"/>
+    <p:sldId id="257" r:id="rId3"/>
   </p:sldIdLst>
   <p:sldSz cx="12192000" cy="6858000"/>
   <p:notesSz cx="6858000" cy="9144000"/>
@@ -104,6 +105,11 @@
       </a:defRPr>
     </a:lvl9pPr>
   </p:defaultTextStyle>
+  <p:extLst>
+    <p:ext uri="{EFAFB233-063F-42B5-8137-9DF3F51BA10A}">
+      <p15:sldGuideLst xmlns:p15="http://schemas.microsoft.com/office/powerpoint/2012/main"/>
+    </p:ext>
+  </p:extLst>
 </p:presentation>
 </file>
 
@@ -254,7 +260,7 @@
           <a:p>
             <a:fld id="{AE04D5E6-9B88-7643-B9F0-ED01B102536C}" type="datetimeFigureOut">
               <a:rPr lang="en-US" smtClean="0"/>
-              <a:t>5/13/25</a:t>
+              <a:t>5/14/25</a:t>
             </a:fld>
             <a:endParaRPr lang="en-US"/>
           </a:p>
@@ -452,7 +458,7 @@
           <a:p>
             <a:fld id="{AE04D5E6-9B88-7643-B9F0-ED01B102536C}" type="datetimeFigureOut">
               <a:rPr lang="en-US" smtClean="0"/>
-              <a:t>5/13/25</a:t>
+              <a:t>5/14/25</a:t>
             </a:fld>
             <a:endParaRPr lang="en-US"/>
           </a:p>
@@ -660,7 +666,7 @@
           <a:p>
             <a:fld id="{AE04D5E6-9B88-7643-B9F0-ED01B102536C}" type="datetimeFigureOut">
               <a:rPr lang="en-US" smtClean="0"/>
-              <a:t>5/13/25</a:t>
+              <a:t>5/14/25</a:t>
             </a:fld>
             <a:endParaRPr lang="en-US"/>
           </a:p>
@@ -858,7 +864,7 @@
           <a:p>
             <a:fld id="{AE04D5E6-9B88-7643-B9F0-ED01B102536C}" type="datetimeFigureOut">
               <a:rPr lang="en-US" smtClean="0"/>
-              <a:t>5/13/25</a:t>
+              <a:t>5/14/25</a:t>
             </a:fld>
             <a:endParaRPr lang="en-US"/>
           </a:p>
@@ -1133,7 +1139,7 @@
           <a:p>
             <a:fld id="{AE04D5E6-9B88-7643-B9F0-ED01B102536C}" type="datetimeFigureOut">
               <a:rPr lang="en-US" smtClean="0"/>
-              <a:t>5/13/25</a:t>
+              <a:t>5/14/25</a:t>
             </a:fld>
             <a:endParaRPr lang="en-US"/>
           </a:p>
@@ -1398,7 +1404,7 @@
           <a:p>
             <a:fld id="{AE04D5E6-9B88-7643-B9F0-ED01B102536C}" type="datetimeFigureOut">
               <a:rPr lang="en-US" smtClean="0"/>
-              <a:t>5/13/25</a:t>
+              <a:t>5/14/25</a:t>
             </a:fld>
             <a:endParaRPr lang="en-US"/>
           </a:p>
@@ -1810,7 +1816,7 @@
           <a:p>
             <a:fld id="{AE04D5E6-9B88-7643-B9F0-ED01B102536C}" type="datetimeFigureOut">
               <a:rPr lang="en-US" smtClean="0"/>
-              <a:t>5/13/25</a:t>
+              <a:t>5/14/25</a:t>
             </a:fld>
             <a:endParaRPr lang="en-US"/>
           </a:p>
@@ -1951,7 +1957,7 @@
           <a:p>
             <a:fld id="{AE04D5E6-9B88-7643-B9F0-ED01B102536C}" type="datetimeFigureOut">
               <a:rPr lang="en-US" smtClean="0"/>
-              <a:t>5/13/25</a:t>
+              <a:t>5/14/25</a:t>
             </a:fld>
             <a:endParaRPr lang="en-US"/>
           </a:p>
@@ -2064,7 +2070,7 @@
           <a:p>
             <a:fld id="{AE04D5E6-9B88-7643-B9F0-ED01B102536C}" type="datetimeFigureOut">
               <a:rPr lang="en-US" smtClean="0"/>
-              <a:t>5/13/25</a:t>
+              <a:t>5/14/25</a:t>
             </a:fld>
             <a:endParaRPr lang="en-US"/>
           </a:p>
@@ -2375,7 +2381,7 @@
           <a:p>
             <a:fld id="{AE04D5E6-9B88-7643-B9F0-ED01B102536C}" type="datetimeFigureOut">
               <a:rPr lang="en-US" smtClean="0"/>
-              <a:t>5/13/25</a:t>
+              <a:t>5/14/25</a:t>
             </a:fld>
             <a:endParaRPr lang="en-US"/>
           </a:p>
@@ -2663,7 +2669,7 @@
           <a:p>
             <a:fld id="{AE04D5E6-9B88-7643-B9F0-ED01B102536C}" type="datetimeFigureOut">
               <a:rPr lang="en-US" smtClean="0"/>
-              <a:t>5/13/25</a:t>
+              <a:t>5/14/25</a:t>
             </a:fld>
             <a:endParaRPr lang="en-US"/>
           </a:p>
@@ -2904,7 +2910,7 @@
           <a:p>
             <a:fld id="{AE04D5E6-9B88-7643-B9F0-ED01B102536C}" type="datetimeFigureOut">
               <a:rPr lang="en-US" smtClean="0"/>
-              <a:t>5/13/25</a:t>
+              <a:t>5/14/25</a:t>
             </a:fld>
             <a:endParaRPr lang="en-US"/>
           </a:p>
@@ -4212,6 +4218,1182 @@
 </p:sld>
 </file>
 
+<file path=ppt/slides/slide2.xml><?xml version="1.0" encoding="utf-8"?>
+<p:sld xmlns:a="http://schemas.openxmlformats.org/drawingml/2006/main" xmlns:r="http://schemas.openxmlformats.org/officeDocument/2006/relationships" xmlns:p="http://schemas.openxmlformats.org/presentationml/2006/main">
+  <p:cSld>
+    <p:spTree>
+      <p:nvGrpSpPr>
+        <p:cNvPr id="1" name=""/>
+        <p:cNvGrpSpPr/>
+        <p:nvPr/>
+      </p:nvGrpSpPr>
+      <p:grpSpPr>
+        <a:xfrm>
+          <a:off x="0" y="0"/>
+          <a:ext cx="0" cy="0"/>
+          <a:chOff x="0" y="0"/>
+          <a:chExt cx="0" cy="0"/>
+        </a:xfrm>
+      </p:grpSpPr>
+      <p:sp>
+        <p:nvSpPr>
+          <p:cNvPr id="58" name="Rounded Rectangle 57">
+            <a:extLst>
+              <a:ext uri="{FF2B5EF4-FFF2-40B4-BE49-F238E27FC236}">
+                <a16:creationId xmlns:a16="http://schemas.microsoft.com/office/drawing/2014/main" id="{00B8407D-CC8D-B721-3B70-2AC008414D02}"/>
+              </a:ext>
+            </a:extLst>
+          </p:cNvPr>
+          <p:cNvSpPr/>
+          <p:nvPr/>
+        </p:nvSpPr>
+        <p:spPr>
+          <a:xfrm>
+            <a:off x="-22551" y="3115298"/>
+            <a:ext cx="12090399" cy="3742701"/>
+          </a:xfrm>
+          <a:prstGeom prst="roundRect">
+            <a:avLst/>
+          </a:prstGeom>
+          <a:solidFill>
+            <a:schemeClr val="accent2">
+              <a:lumMod val="40000"/>
+              <a:lumOff val="60000"/>
+            </a:schemeClr>
+          </a:solidFill>
+        </p:spPr>
+        <p:style>
+          <a:lnRef idx="2">
+            <a:schemeClr val="accent1">
+              <a:shade val="15000"/>
+            </a:schemeClr>
+          </a:lnRef>
+          <a:fillRef idx="1">
+            <a:schemeClr val="accent1"/>
+          </a:fillRef>
+          <a:effectRef idx="0">
+            <a:schemeClr val="accent1"/>
+          </a:effectRef>
+          <a:fontRef idx="minor">
+            <a:schemeClr val="lt1"/>
+          </a:fontRef>
+        </p:style>
+        <p:txBody>
+          <a:bodyPr rtlCol="0" anchor="ctr"/>
+          <a:lstStyle/>
+          <a:p>
+            <a:pPr algn="ctr"/>
+            <a:endParaRPr lang="en-US"/>
+          </a:p>
+        </p:txBody>
+      </p:sp>
+      <p:sp>
+        <p:nvSpPr>
+          <p:cNvPr id="55" name="Rounded Rectangle 54">
+            <a:extLst>
+              <a:ext uri="{FF2B5EF4-FFF2-40B4-BE49-F238E27FC236}">
+                <a16:creationId xmlns:a16="http://schemas.microsoft.com/office/drawing/2014/main" id="{1409930D-6C45-2163-346E-F990BE583719}"/>
+              </a:ext>
+            </a:extLst>
+          </p:cNvPr>
+          <p:cNvSpPr/>
+          <p:nvPr/>
+        </p:nvSpPr>
+        <p:spPr>
+          <a:xfrm>
+            <a:off x="0" y="66825"/>
+            <a:ext cx="12090399" cy="2964736"/>
+          </a:xfrm>
+          <a:prstGeom prst="roundRect">
+            <a:avLst/>
+          </a:prstGeom>
+          <a:solidFill>
+            <a:schemeClr val="accent4">
+              <a:lumMod val="40000"/>
+              <a:lumOff val="60000"/>
+            </a:schemeClr>
+          </a:solidFill>
+        </p:spPr>
+        <p:style>
+          <a:lnRef idx="2">
+            <a:schemeClr val="accent1">
+              <a:shade val="15000"/>
+            </a:schemeClr>
+          </a:lnRef>
+          <a:fillRef idx="1">
+            <a:schemeClr val="accent1"/>
+          </a:fillRef>
+          <a:effectRef idx="0">
+            <a:schemeClr val="accent1"/>
+          </a:effectRef>
+          <a:fontRef idx="minor">
+            <a:schemeClr val="lt1"/>
+          </a:fontRef>
+        </p:style>
+        <p:txBody>
+          <a:bodyPr rtlCol="0" anchor="ctr"/>
+          <a:lstStyle/>
+          <a:p>
+            <a:pPr algn="ctr"/>
+            <a:endParaRPr lang="en-US"/>
+          </a:p>
+        </p:txBody>
+      </p:sp>
+      <p:pic>
+        <p:nvPicPr>
+          <p:cNvPr id="5" name="Content Placeholder 4" descr="A graph of a graph&#10;&#10;AI-generated content may be incorrect.">
+            <a:extLst>
+              <a:ext uri="{FF2B5EF4-FFF2-40B4-BE49-F238E27FC236}">
+                <a16:creationId xmlns:a16="http://schemas.microsoft.com/office/drawing/2014/main" id="{7C31A75B-7EE1-648B-423F-100C3CC4255E}"/>
+              </a:ext>
+            </a:extLst>
+          </p:cNvPr>
+          <p:cNvPicPr>
+            <a:picLocks noGrp="1" noChangeAspect="1"/>
+          </p:cNvPicPr>
+          <p:nvPr>
+            <p:ph idx="1"/>
+          </p:nvPr>
+        </p:nvPicPr>
+        <p:blipFill>
+          <a:blip r:embed="rId2"/>
+          <a:stretch>
+            <a:fillRect/>
+          </a:stretch>
+        </p:blipFill>
+        <p:spPr>
+          <a:xfrm>
+            <a:off x="8902329" y="4629873"/>
+            <a:ext cx="3086330" cy="1655687"/>
+          </a:xfrm>
+        </p:spPr>
+      </p:pic>
+      <p:pic>
+        <p:nvPicPr>
+          <p:cNvPr id="7" name="Picture 6" descr="A graph with a blue line&#10;&#10;AI-generated content may be incorrect.">
+            <a:extLst>
+              <a:ext uri="{FF2B5EF4-FFF2-40B4-BE49-F238E27FC236}">
+                <a16:creationId xmlns:a16="http://schemas.microsoft.com/office/drawing/2014/main" id="{948A36E2-CE4C-BE40-D7AD-9BF2B87E4A30}"/>
+              </a:ext>
+            </a:extLst>
+          </p:cNvPr>
+          <p:cNvPicPr>
+            <a:picLocks noChangeAspect="1"/>
+          </p:cNvPicPr>
+          <p:nvPr/>
+        </p:nvPicPr>
+        <p:blipFill>
+          <a:blip r:embed="rId3"/>
+          <a:stretch>
+            <a:fillRect/>
+          </a:stretch>
+        </p:blipFill>
+        <p:spPr>
+          <a:xfrm>
+            <a:off x="7655275" y="224354"/>
+            <a:ext cx="4275668" cy="1710267"/>
+          </a:xfrm>
+          <a:prstGeom prst="rect">
+            <a:avLst/>
+          </a:prstGeom>
+        </p:spPr>
+      </p:pic>
+      <p:pic>
+        <p:nvPicPr>
+          <p:cNvPr id="11" name="Picture 10" descr="A graph showing a line graph&#10;&#10;AI-generated content may be incorrect.">
+            <a:extLst>
+              <a:ext uri="{FF2B5EF4-FFF2-40B4-BE49-F238E27FC236}">
+                <a16:creationId xmlns:a16="http://schemas.microsoft.com/office/drawing/2014/main" id="{6F65C6B2-0753-C5E3-D803-FC38ED3F8C65}"/>
+              </a:ext>
+            </a:extLst>
+          </p:cNvPr>
+          <p:cNvPicPr>
+            <a:picLocks noChangeAspect="1"/>
+          </p:cNvPicPr>
+          <p:nvPr/>
+        </p:nvPicPr>
+        <p:blipFill>
+          <a:blip r:embed="rId4"/>
+          <a:stretch>
+            <a:fillRect/>
+          </a:stretch>
+        </p:blipFill>
+        <p:spPr>
+          <a:xfrm>
+            <a:off x="4557117" y="4376413"/>
+            <a:ext cx="4275668" cy="1832429"/>
+          </a:xfrm>
+          <a:prstGeom prst="rect">
+            <a:avLst/>
+          </a:prstGeom>
+        </p:spPr>
+      </p:pic>
+      <p:pic>
+        <p:nvPicPr>
+          <p:cNvPr id="15" name="Picture 14" descr="A graph showing a graph of a wave&#10;&#10;AI-generated content may be incorrect.">
+            <a:extLst>
+              <a:ext uri="{FF2B5EF4-FFF2-40B4-BE49-F238E27FC236}">
+                <a16:creationId xmlns:a16="http://schemas.microsoft.com/office/drawing/2014/main" id="{272358EF-A03F-DAAF-298D-7C95969490AE}"/>
+              </a:ext>
+            </a:extLst>
+          </p:cNvPr>
+          <p:cNvPicPr>
+            <a:picLocks noChangeAspect="1"/>
+          </p:cNvPicPr>
+          <p:nvPr/>
+        </p:nvPicPr>
+        <p:blipFill>
+          <a:blip r:embed="rId5"/>
+          <a:stretch>
+            <a:fillRect/>
+          </a:stretch>
+        </p:blipFill>
+        <p:spPr>
+          <a:xfrm>
+            <a:off x="2893854" y="220894"/>
+            <a:ext cx="2692400" cy="1346200"/>
+          </a:xfrm>
+          <a:prstGeom prst="rect">
+            <a:avLst/>
+          </a:prstGeom>
+        </p:spPr>
+      </p:pic>
+      <p:pic>
+        <p:nvPicPr>
+          <p:cNvPr id="17" name="Picture 16" descr="A graph showing a graph of a graph&#10;&#10;AI-generated content may be incorrect.">
+            <a:extLst>
+              <a:ext uri="{FF2B5EF4-FFF2-40B4-BE49-F238E27FC236}">
+                <a16:creationId xmlns:a16="http://schemas.microsoft.com/office/drawing/2014/main" id="{46119FF7-FFD9-F65A-806E-BDF2CA8F6E15}"/>
+              </a:ext>
+            </a:extLst>
+          </p:cNvPr>
+          <p:cNvPicPr>
+            <a:picLocks noChangeAspect="1"/>
+          </p:cNvPicPr>
+          <p:nvPr/>
+        </p:nvPicPr>
+        <p:blipFill>
+          <a:blip r:embed="rId6"/>
+          <a:stretch>
+            <a:fillRect/>
+          </a:stretch>
+        </p:blipFill>
+        <p:spPr>
+          <a:xfrm>
+            <a:off x="2972191" y="1424050"/>
+            <a:ext cx="2614062" cy="1307031"/>
+          </a:xfrm>
+          <a:prstGeom prst="rect">
+            <a:avLst/>
+          </a:prstGeom>
+        </p:spPr>
+      </p:pic>
+      <p:pic>
+        <p:nvPicPr>
+          <p:cNvPr id="21" name="Picture 20" descr="A graph showing a number of numbers and a line&#10;&#10;AI-generated content may be incorrect.">
+            <a:extLst>
+              <a:ext uri="{FF2B5EF4-FFF2-40B4-BE49-F238E27FC236}">
+                <a16:creationId xmlns:a16="http://schemas.microsoft.com/office/drawing/2014/main" id="{B5BED35F-29C7-CEAC-2F4D-5DEA68F28C31}"/>
+              </a:ext>
+            </a:extLst>
+          </p:cNvPr>
+          <p:cNvPicPr>
+            <a:picLocks noChangeAspect="1"/>
+          </p:cNvPicPr>
+          <p:nvPr/>
+        </p:nvPicPr>
+        <p:blipFill>
+          <a:blip r:embed="rId7"/>
+          <a:stretch>
+            <a:fillRect/>
+          </a:stretch>
+        </p:blipFill>
+        <p:spPr>
+          <a:xfrm>
+            <a:off x="259329" y="189628"/>
+            <a:ext cx="2692400" cy="1346200"/>
+          </a:xfrm>
+          <a:prstGeom prst="rect">
+            <a:avLst/>
+          </a:prstGeom>
+        </p:spPr>
+      </p:pic>
+      <p:pic>
+        <p:nvPicPr>
+          <p:cNvPr id="23" name="Picture 22" descr="A graph showing a line of blue green and red&#10;&#10;AI-generated content may be incorrect.">
+            <a:extLst>
+              <a:ext uri="{FF2B5EF4-FFF2-40B4-BE49-F238E27FC236}">
+                <a16:creationId xmlns:a16="http://schemas.microsoft.com/office/drawing/2014/main" id="{A83EE490-19DB-F6BD-F9D9-1C0C8AFFAED0}"/>
+              </a:ext>
+            </a:extLst>
+          </p:cNvPr>
+          <p:cNvPicPr>
+            <a:picLocks noChangeAspect="1"/>
+          </p:cNvPicPr>
+          <p:nvPr/>
+        </p:nvPicPr>
+        <p:blipFill>
+          <a:blip r:embed="rId8"/>
+          <a:stretch>
+            <a:fillRect/>
+          </a:stretch>
+        </p:blipFill>
+        <p:spPr>
+          <a:xfrm>
+            <a:off x="124152" y="4411139"/>
+            <a:ext cx="4275668" cy="1832429"/>
+          </a:xfrm>
+          <a:prstGeom prst="rect">
+            <a:avLst/>
+          </a:prstGeom>
+        </p:spPr>
+      </p:pic>
+      <p:pic>
+        <p:nvPicPr>
+          <p:cNvPr id="24" name="Picture 23" descr="A graph showing a line&#10;&#10;AI-generated content may be incorrect.">
+            <a:extLst>
+              <a:ext uri="{FF2B5EF4-FFF2-40B4-BE49-F238E27FC236}">
+                <a16:creationId xmlns:a16="http://schemas.microsoft.com/office/drawing/2014/main" id="{D1571C38-3524-7BDB-0236-793737D176D6}"/>
+              </a:ext>
+            </a:extLst>
+          </p:cNvPr>
+          <p:cNvPicPr>
+            <a:picLocks noChangeAspect="1"/>
+          </p:cNvPicPr>
+          <p:nvPr/>
+        </p:nvPicPr>
+        <p:blipFill>
+          <a:blip r:embed="rId9"/>
+          <a:stretch>
+            <a:fillRect/>
+          </a:stretch>
+        </p:blipFill>
+        <p:spPr>
+          <a:xfrm>
+            <a:off x="214373" y="1401572"/>
+            <a:ext cx="2737356" cy="1368678"/>
+          </a:xfrm>
+          <a:prstGeom prst="rect">
+            <a:avLst/>
+          </a:prstGeom>
+        </p:spPr>
+      </p:pic>
+      <p:sp>
+        <p:nvSpPr>
+          <p:cNvPr id="25" name="TextBox 24">
+            <a:extLst>
+              <a:ext uri="{FF2B5EF4-FFF2-40B4-BE49-F238E27FC236}">
+                <a16:creationId xmlns:a16="http://schemas.microsoft.com/office/drawing/2014/main" id="{BC780912-5AEA-0F9C-95D0-3BD063A7ABF5}"/>
+              </a:ext>
+            </a:extLst>
+          </p:cNvPr>
+          <p:cNvSpPr txBox="1"/>
+          <p:nvPr/>
+        </p:nvSpPr>
+        <p:spPr>
+          <a:xfrm>
+            <a:off x="5722125" y="259798"/>
+            <a:ext cx="1991024" cy="1477328"/>
+          </a:xfrm>
+          <a:prstGeom prst="rect">
+            <a:avLst/>
+          </a:prstGeom>
+          <a:noFill/>
+        </p:spPr>
+        <p:txBody>
+          <a:bodyPr wrap="square" rtlCol="0">
+            <a:spAutoFit/>
+          </a:bodyPr>
+          <a:lstStyle/>
+          <a:p>
+            <a:r>
+              <a:rPr lang="en-US" sz="1400" b="1" dirty="0">
+                <a:latin typeface="Verdana" panose="020B0604030504040204" pitchFamily="34" charset="0"/>
+                <a:ea typeface="Verdana" panose="020B0604030504040204" pitchFamily="34" charset="0"/>
+                <a:cs typeface="Verdana" panose="020B0604030504040204" pitchFamily="34" charset="0"/>
+              </a:rPr>
+              <a:t>(B) Process-based bulk oxygen model</a:t>
+            </a:r>
+          </a:p>
+          <a:p>
+            <a:pPr marL="285750" indent="-285750">
+              <a:buFont typeface="Arial" panose="020B0604020202020204" pitchFamily="34" charset="0"/>
+              <a:buChar char="•"/>
+            </a:pPr>
+            <a:r>
+              <a:rPr lang="en-US" sz="1200" dirty="0">
+                <a:latin typeface="Verdana" panose="020B0604030504040204" pitchFamily="34" charset="0"/>
+                <a:ea typeface="Verdana" panose="020B0604030504040204" pitchFamily="34" charset="0"/>
+                <a:cs typeface="Verdana" panose="020B0604030504040204" pitchFamily="34" charset="0"/>
+              </a:rPr>
+              <a:t>Atmospheric exchange</a:t>
+            </a:r>
+          </a:p>
+          <a:p>
+            <a:pPr marL="285750" indent="-285750">
+              <a:buFont typeface="Arial" panose="020B0604020202020204" pitchFamily="34" charset="0"/>
+              <a:buChar char="•"/>
+            </a:pPr>
+            <a:r>
+              <a:rPr lang="en-US" sz="1200" dirty="0">
+                <a:latin typeface="Verdana" panose="020B0604030504040204" pitchFamily="34" charset="0"/>
+                <a:ea typeface="Verdana" panose="020B0604030504040204" pitchFamily="34" charset="0"/>
+                <a:cs typeface="Verdana" panose="020B0604030504040204" pitchFamily="34" charset="0"/>
+              </a:rPr>
+              <a:t>Primary production</a:t>
+            </a:r>
+          </a:p>
+          <a:p>
+            <a:pPr marL="285750" indent="-285750">
+              <a:buFont typeface="Arial" panose="020B0604020202020204" pitchFamily="34" charset="0"/>
+              <a:buChar char="•"/>
+            </a:pPr>
+            <a:r>
+              <a:rPr lang="en-US" sz="1200" dirty="0">
+                <a:latin typeface="Verdana" panose="020B0604030504040204" pitchFamily="34" charset="0"/>
+                <a:ea typeface="Verdana" panose="020B0604030504040204" pitchFamily="34" charset="0"/>
+                <a:cs typeface="Verdana" panose="020B0604030504040204" pitchFamily="34" charset="0"/>
+              </a:rPr>
+              <a:t>Respiration </a:t>
+            </a:r>
+          </a:p>
+        </p:txBody>
+      </p:sp>
+      <p:pic>
+        <p:nvPicPr>
+          <p:cNvPr id="26" name="Picture 25">
+            <a:extLst>
+              <a:ext uri="{FF2B5EF4-FFF2-40B4-BE49-F238E27FC236}">
+                <a16:creationId xmlns:a16="http://schemas.microsoft.com/office/drawing/2014/main" id="{CAD63D90-77DA-7C78-E117-4582A634E471}"/>
+              </a:ext>
+            </a:extLst>
+          </p:cNvPr>
+          <p:cNvPicPr>
+            <a:picLocks noChangeAspect="1"/>
+          </p:cNvPicPr>
+          <p:nvPr/>
+        </p:nvPicPr>
+        <p:blipFill>
+          <a:blip r:embed="rId10"/>
+          <a:stretch>
+            <a:fillRect/>
+          </a:stretch>
+        </p:blipFill>
+        <p:spPr>
+          <a:xfrm>
+            <a:off x="7680978" y="2039611"/>
+            <a:ext cx="4307840" cy="400109"/>
+          </a:xfrm>
+          <a:prstGeom prst="rect">
+            <a:avLst/>
+          </a:prstGeom>
+        </p:spPr>
+      </p:pic>
+      <p:sp>
+        <p:nvSpPr>
+          <p:cNvPr id="27" name="TextBox 26">
+            <a:extLst>
+              <a:ext uri="{FF2B5EF4-FFF2-40B4-BE49-F238E27FC236}">
+                <a16:creationId xmlns:a16="http://schemas.microsoft.com/office/drawing/2014/main" id="{9293069D-AE42-68DE-051E-5A5C84A31F1D}"/>
+              </a:ext>
+            </a:extLst>
+          </p:cNvPr>
+          <p:cNvSpPr txBox="1"/>
+          <p:nvPr/>
+        </p:nvSpPr>
+        <p:spPr>
+          <a:xfrm>
+            <a:off x="1662464" y="2732739"/>
+            <a:ext cx="2737356" cy="307777"/>
+          </a:xfrm>
+          <a:prstGeom prst="rect">
+            <a:avLst/>
+          </a:prstGeom>
+          <a:noFill/>
+        </p:spPr>
+        <p:txBody>
+          <a:bodyPr wrap="square" rtlCol="0">
+            <a:spAutoFit/>
+          </a:bodyPr>
+          <a:lstStyle/>
+          <a:p>
+            <a:r>
+              <a:rPr lang="en-US" sz="1400" b="1" dirty="0">
+                <a:latin typeface="Verdana" panose="020B0604030504040204" pitchFamily="34" charset="0"/>
+                <a:ea typeface="Verdana" panose="020B0604030504040204" pitchFamily="34" charset="0"/>
+                <a:cs typeface="Verdana" panose="020B0604030504040204" pitchFamily="34" charset="0"/>
+              </a:rPr>
+              <a:t>(A) Monitoring data</a:t>
+            </a:r>
+          </a:p>
+        </p:txBody>
+      </p:sp>
+      <p:sp>
+        <p:nvSpPr>
+          <p:cNvPr id="28" name="TextBox 27">
+            <a:extLst>
+              <a:ext uri="{FF2B5EF4-FFF2-40B4-BE49-F238E27FC236}">
+                <a16:creationId xmlns:a16="http://schemas.microsoft.com/office/drawing/2014/main" id="{CE8C0767-7093-D374-3F7F-AD0313B5739C}"/>
+              </a:ext>
+            </a:extLst>
+          </p:cNvPr>
+          <p:cNvSpPr txBox="1"/>
+          <p:nvPr/>
+        </p:nvSpPr>
+        <p:spPr>
+          <a:xfrm>
+            <a:off x="2893854" y="3439198"/>
+            <a:ext cx="1755859" cy="523220"/>
+          </a:xfrm>
+          <a:prstGeom prst="rect">
+            <a:avLst/>
+          </a:prstGeom>
+          <a:noFill/>
+        </p:spPr>
+        <p:txBody>
+          <a:bodyPr wrap="square" rtlCol="0">
+            <a:spAutoFit/>
+          </a:bodyPr>
+          <a:lstStyle/>
+          <a:p>
+            <a:r>
+              <a:rPr lang="en-US" sz="1400" b="1" dirty="0">
+                <a:latin typeface="Verdana" panose="020B0604030504040204" pitchFamily="34" charset="0"/>
+                <a:ea typeface="Verdana" panose="020B0604030504040204" pitchFamily="34" charset="0"/>
+                <a:cs typeface="Verdana" panose="020B0604030504040204" pitchFamily="34" charset="0"/>
+              </a:rPr>
+              <a:t>(C) Encoder-Decoder LSTM</a:t>
+            </a:r>
+          </a:p>
+        </p:txBody>
+      </p:sp>
+      <p:sp>
+        <p:nvSpPr>
+          <p:cNvPr id="29" name="TextBox 28">
+            <a:extLst>
+              <a:ext uri="{FF2B5EF4-FFF2-40B4-BE49-F238E27FC236}">
+                <a16:creationId xmlns:a16="http://schemas.microsoft.com/office/drawing/2014/main" id="{3B359EF3-F371-B403-8E7B-EF50A85415E3}"/>
+              </a:ext>
+            </a:extLst>
+          </p:cNvPr>
+          <p:cNvSpPr txBox="1"/>
+          <p:nvPr/>
+        </p:nvSpPr>
+        <p:spPr>
+          <a:xfrm>
+            <a:off x="138898" y="6267955"/>
+            <a:ext cx="4476093" cy="523220"/>
+          </a:xfrm>
+          <a:prstGeom prst="rect">
+            <a:avLst/>
+          </a:prstGeom>
+          <a:noFill/>
+        </p:spPr>
+        <p:txBody>
+          <a:bodyPr wrap="square" rtlCol="0">
+            <a:spAutoFit/>
+          </a:bodyPr>
+          <a:lstStyle/>
+          <a:p>
+            <a:r>
+              <a:rPr lang="en-US" sz="1400" b="1" dirty="0">
+                <a:latin typeface="Verdana" panose="020B0604030504040204" pitchFamily="34" charset="0"/>
+                <a:ea typeface="Verdana" panose="020B0604030504040204" pitchFamily="34" charset="0"/>
+                <a:cs typeface="Verdana" panose="020B0604030504040204" pitchFamily="34" charset="0"/>
+              </a:rPr>
+              <a:t>(D) Self-supervised clustering through self-attention </a:t>
+            </a:r>
+          </a:p>
+        </p:txBody>
+      </p:sp>
+      <p:sp>
+        <p:nvSpPr>
+          <p:cNvPr id="30" name="TextBox 29">
+            <a:extLst>
+              <a:ext uri="{FF2B5EF4-FFF2-40B4-BE49-F238E27FC236}">
+                <a16:creationId xmlns:a16="http://schemas.microsoft.com/office/drawing/2014/main" id="{17529486-6E0D-A0FF-3577-8C8E9F4D5AF9}"/>
+              </a:ext>
+            </a:extLst>
+          </p:cNvPr>
+          <p:cNvSpPr txBox="1"/>
+          <p:nvPr/>
+        </p:nvSpPr>
+        <p:spPr>
+          <a:xfrm>
+            <a:off x="5046562" y="3134099"/>
+            <a:ext cx="3741534" cy="738664"/>
+          </a:xfrm>
+          <a:prstGeom prst="rect">
+            <a:avLst/>
+          </a:prstGeom>
+          <a:noFill/>
+        </p:spPr>
+        <p:txBody>
+          <a:bodyPr wrap="square" rtlCol="0">
+            <a:spAutoFit/>
+          </a:bodyPr>
+          <a:lstStyle/>
+          <a:p>
+            <a:r>
+              <a:rPr lang="en-US" sz="1400" b="1" dirty="0">
+                <a:latin typeface="Verdana" panose="020B0604030504040204" pitchFamily="34" charset="0"/>
+                <a:ea typeface="Verdana" panose="020B0604030504040204" pitchFamily="34" charset="0"/>
+                <a:cs typeface="Verdana" panose="020B0604030504040204" pitchFamily="34" charset="0"/>
+              </a:rPr>
+              <a:t>(E1) Knowledge-guided initialization on modeled DO (pre-training)</a:t>
+            </a:r>
+          </a:p>
+        </p:txBody>
+      </p:sp>
+      <p:sp>
+        <p:nvSpPr>
+          <p:cNvPr id="31" name="TextBox 30">
+            <a:extLst>
+              <a:ext uri="{FF2B5EF4-FFF2-40B4-BE49-F238E27FC236}">
+                <a16:creationId xmlns:a16="http://schemas.microsoft.com/office/drawing/2014/main" id="{6F43331E-D2E0-2047-37C4-0B1AC8806E5D}"/>
+              </a:ext>
+            </a:extLst>
+          </p:cNvPr>
+          <p:cNvSpPr txBox="1"/>
+          <p:nvPr/>
+        </p:nvSpPr>
+        <p:spPr>
+          <a:xfrm>
+            <a:off x="6363161" y="3649402"/>
+            <a:ext cx="2469624" cy="523220"/>
+          </a:xfrm>
+          <a:prstGeom prst="rect">
+            <a:avLst/>
+          </a:prstGeom>
+          <a:noFill/>
+        </p:spPr>
+        <p:txBody>
+          <a:bodyPr wrap="square" rtlCol="0">
+            <a:spAutoFit/>
+          </a:bodyPr>
+          <a:lstStyle/>
+          <a:p>
+            <a:r>
+              <a:rPr lang="en-US" sz="1400" b="1" dirty="0">
+                <a:latin typeface="Verdana" panose="020B0604030504040204" pitchFamily="34" charset="0"/>
+                <a:ea typeface="Verdana" panose="020B0604030504040204" pitchFamily="34" charset="0"/>
+                <a:cs typeface="Verdana" panose="020B0604030504040204" pitchFamily="34" charset="0"/>
+              </a:rPr>
+              <a:t>(E2) Fine-tuning on observed DO data</a:t>
+            </a:r>
+          </a:p>
+        </p:txBody>
+      </p:sp>
+      <p:sp>
+        <p:nvSpPr>
+          <p:cNvPr id="32" name="TextBox 31">
+            <a:extLst>
+              <a:ext uri="{FF2B5EF4-FFF2-40B4-BE49-F238E27FC236}">
+                <a16:creationId xmlns:a16="http://schemas.microsoft.com/office/drawing/2014/main" id="{CAAA826B-97F2-8302-8653-996936210500}"/>
+              </a:ext>
+            </a:extLst>
+          </p:cNvPr>
+          <p:cNvSpPr txBox="1"/>
+          <p:nvPr/>
+        </p:nvSpPr>
+        <p:spPr>
+          <a:xfrm>
+            <a:off x="4469364" y="6260981"/>
+            <a:ext cx="4573482" cy="307777"/>
+          </a:xfrm>
+          <a:prstGeom prst="rect">
+            <a:avLst/>
+          </a:prstGeom>
+          <a:noFill/>
+        </p:spPr>
+        <p:txBody>
+          <a:bodyPr wrap="square" rtlCol="0">
+            <a:spAutoFit/>
+          </a:bodyPr>
+          <a:lstStyle/>
+          <a:p>
+            <a:r>
+              <a:rPr lang="en-US" sz="1400" b="1" dirty="0">
+                <a:latin typeface="Verdana" panose="020B0604030504040204" pitchFamily="34" charset="0"/>
+                <a:ea typeface="Verdana" panose="020B0604030504040204" pitchFamily="34" charset="0"/>
+                <a:cs typeface="Verdana" panose="020B0604030504040204" pitchFamily="34" charset="0"/>
+              </a:rPr>
+              <a:t>(E3) DL model replicates observed data</a:t>
+            </a:r>
+          </a:p>
+        </p:txBody>
+      </p:sp>
+      <p:sp>
+        <p:nvSpPr>
+          <p:cNvPr id="33" name="TextBox 32">
+            <a:extLst>
+              <a:ext uri="{FF2B5EF4-FFF2-40B4-BE49-F238E27FC236}">
+                <a16:creationId xmlns:a16="http://schemas.microsoft.com/office/drawing/2014/main" id="{55633111-91A6-DB15-6F36-BFD0039D67FB}"/>
+              </a:ext>
+            </a:extLst>
+          </p:cNvPr>
+          <p:cNvSpPr txBox="1"/>
+          <p:nvPr/>
+        </p:nvSpPr>
+        <p:spPr>
+          <a:xfrm>
+            <a:off x="8902328" y="3545227"/>
+            <a:ext cx="3490364" cy="738664"/>
+          </a:xfrm>
+          <a:prstGeom prst="rect">
+            <a:avLst/>
+          </a:prstGeom>
+          <a:noFill/>
+        </p:spPr>
+        <p:txBody>
+          <a:bodyPr wrap="square" rtlCol="0">
+            <a:spAutoFit/>
+          </a:bodyPr>
+          <a:lstStyle/>
+          <a:p>
+            <a:r>
+              <a:rPr lang="en-US" sz="1400" b="1" dirty="0">
+                <a:latin typeface="Verdana" panose="020B0604030504040204" pitchFamily="34" charset="0"/>
+                <a:ea typeface="Verdana" panose="020B0604030504040204" pitchFamily="34" charset="0"/>
+                <a:cs typeface="Verdana" panose="020B0604030504040204" pitchFamily="34" charset="0"/>
+              </a:rPr>
+              <a:t>(F) Explanatory ML highlights that DL uses the clusters (compound information)</a:t>
+            </a:r>
+          </a:p>
+        </p:txBody>
+      </p:sp>
+      <p:pic>
+        <p:nvPicPr>
+          <p:cNvPr id="35" name="Picture 34" descr="A diagram of a computer code&#10;&#10;AI-generated content may be incorrect.">
+            <a:extLst>
+              <a:ext uri="{FF2B5EF4-FFF2-40B4-BE49-F238E27FC236}">
+                <a16:creationId xmlns:a16="http://schemas.microsoft.com/office/drawing/2014/main" id="{8B9B504E-90DF-4876-2036-1D0B36CB1AD4}"/>
+              </a:ext>
+            </a:extLst>
+          </p:cNvPr>
+          <p:cNvPicPr>
+            <a:picLocks noChangeAspect="1"/>
+          </p:cNvPicPr>
+          <p:nvPr/>
+        </p:nvPicPr>
+        <p:blipFill>
+          <a:blip r:embed="rId11"/>
+          <a:srcRect t="24196"/>
+          <a:stretch>
+            <a:fillRect/>
+          </a:stretch>
+        </p:blipFill>
+        <p:spPr>
+          <a:xfrm>
+            <a:off x="352281" y="3246242"/>
+            <a:ext cx="2461540" cy="1050262"/>
+          </a:xfrm>
+          <a:prstGeom prst="rect">
+            <a:avLst/>
+          </a:prstGeom>
+        </p:spPr>
+      </p:pic>
+      <p:cxnSp>
+        <p:nvCxnSpPr>
+          <p:cNvPr id="36" name="Straight Arrow Connector 35">
+            <a:extLst>
+              <a:ext uri="{FF2B5EF4-FFF2-40B4-BE49-F238E27FC236}">
+                <a16:creationId xmlns:a16="http://schemas.microsoft.com/office/drawing/2014/main" id="{1E272345-7EF9-3981-CE73-DD43539C47B1}"/>
+              </a:ext>
+            </a:extLst>
+          </p:cNvPr>
+          <p:cNvCxnSpPr>
+            <a:cxnSpLocks/>
+          </p:cNvCxnSpPr>
+          <p:nvPr/>
+        </p:nvCxnSpPr>
+        <p:spPr>
+          <a:xfrm>
+            <a:off x="5856834" y="2011485"/>
+            <a:ext cx="1655136" cy="0"/>
+          </a:xfrm>
+          <a:prstGeom prst="straightConnector1">
+            <a:avLst/>
+          </a:prstGeom>
+          <a:ln w="57150">
+            <a:solidFill>
+              <a:schemeClr val="tx1"/>
+            </a:solidFill>
+            <a:tailEnd type="triangle"/>
+          </a:ln>
+        </p:spPr>
+        <p:style>
+          <a:lnRef idx="2">
+            <a:schemeClr val="accent1"/>
+          </a:lnRef>
+          <a:fillRef idx="0">
+            <a:schemeClr val="accent1"/>
+          </a:fillRef>
+          <a:effectRef idx="1">
+            <a:schemeClr val="accent1"/>
+          </a:effectRef>
+          <a:fontRef idx="minor">
+            <a:schemeClr val="tx1"/>
+          </a:fontRef>
+        </p:style>
+      </p:cxnSp>
+      <p:cxnSp>
+        <p:nvCxnSpPr>
+          <p:cNvPr id="38" name="Straight Arrow Connector 37">
+            <a:extLst>
+              <a:ext uri="{FF2B5EF4-FFF2-40B4-BE49-F238E27FC236}">
+                <a16:creationId xmlns:a16="http://schemas.microsoft.com/office/drawing/2014/main" id="{667168C0-3AB6-0BC7-D481-601FE1DA7555}"/>
+              </a:ext>
+            </a:extLst>
+          </p:cNvPr>
+          <p:cNvCxnSpPr>
+            <a:cxnSpLocks/>
+          </p:cNvCxnSpPr>
+          <p:nvPr/>
+        </p:nvCxnSpPr>
+        <p:spPr>
+          <a:xfrm>
+            <a:off x="3414532" y="3040516"/>
+            <a:ext cx="0" cy="407637"/>
+          </a:xfrm>
+          <a:prstGeom prst="straightConnector1">
+            <a:avLst/>
+          </a:prstGeom>
+          <a:ln w="57150">
+            <a:solidFill>
+              <a:schemeClr val="tx1"/>
+            </a:solidFill>
+            <a:tailEnd type="triangle"/>
+          </a:ln>
+        </p:spPr>
+        <p:style>
+          <a:lnRef idx="2">
+            <a:schemeClr val="accent1"/>
+          </a:lnRef>
+          <a:fillRef idx="0">
+            <a:schemeClr val="accent1"/>
+          </a:fillRef>
+          <a:effectRef idx="1">
+            <a:schemeClr val="accent1"/>
+          </a:effectRef>
+          <a:fontRef idx="minor">
+            <a:schemeClr val="tx1"/>
+          </a:fontRef>
+        </p:style>
+      </p:cxnSp>
+      <p:cxnSp>
+        <p:nvCxnSpPr>
+          <p:cNvPr id="41" name="Straight Arrow Connector 40">
+            <a:extLst>
+              <a:ext uri="{FF2B5EF4-FFF2-40B4-BE49-F238E27FC236}">
+                <a16:creationId xmlns:a16="http://schemas.microsoft.com/office/drawing/2014/main" id="{4ED6AC9E-9A39-CAB4-AF03-C24C27A8C521}"/>
+              </a:ext>
+            </a:extLst>
+          </p:cNvPr>
+          <p:cNvCxnSpPr>
+            <a:cxnSpLocks/>
+          </p:cNvCxnSpPr>
+          <p:nvPr/>
+        </p:nvCxnSpPr>
+        <p:spPr>
+          <a:xfrm>
+            <a:off x="3613231" y="3962418"/>
+            <a:ext cx="0" cy="407637"/>
+          </a:xfrm>
+          <a:prstGeom prst="straightConnector1">
+            <a:avLst/>
+          </a:prstGeom>
+          <a:ln w="57150">
+            <a:solidFill>
+              <a:schemeClr val="tx1"/>
+            </a:solidFill>
+            <a:tailEnd type="triangle"/>
+          </a:ln>
+        </p:spPr>
+        <p:style>
+          <a:lnRef idx="2">
+            <a:schemeClr val="accent1"/>
+          </a:lnRef>
+          <a:fillRef idx="0">
+            <a:schemeClr val="accent1"/>
+          </a:fillRef>
+          <a:effectRef idx="1">
+            <a:schemeClr val="accent1"/>
+          </a:effectRef>
+          <a:fontRef idx="minor">
+            <a:schemeClr val="tx1"/>
+          </a:fontRef>
+        </p:style>
+      </p:cxnSp>
+      <p:cxnSp>
+        <p:nvCxnSpPr>
+          <p:cNvPr id="42" name="Straight Arrow Connector 41">
+            <a:extLst>
+              <a:ext uri="{FF2B5EF4-FFF2-40B4-BE49-F238E27FC236}">
+                <a16:creationId xmlns:a16="http://schemas.microsoft.com/office/drawing/2014/main" id="{FECC8E67-19B3-95F3-4304-C812F84D4D1D}"/>
+              </a:ext>
+            </a:extLst>
+          </p:cNvPr>
+          <p:cNvCxnSpPr>
+            <a:cxnSpLocks/>
+          </p:cNvCxnSpPr>
+          <p:nvPr/>
+        </p:nvCxnSpPr>
+        <p:spPr>
+          <a:xfrm>
+            <a:off x="4399820" y="3545227"/>
+            <a:ext cx="646742" cy="8792"/>
+          </a:xfrm>
+          <a:prstGeom prst="straightConnector1">
+            <a:avLst/>
+          </a:prstGeom>
+          <a:ln w="57150">
+            <a:solidFill>
+              <a:schemeClr val="tx1"/>
+            </a:solidFill>
+            <a:tailEnd type="triangle"/>
+          </a:ln>
+        </p:spPr>
+        <p:style>
+          <a:lnRef idx="2">
+            <a:schemeClr val="accent1"/>
+          </a:lnRef>
+          <a:fillRef idx="0">
+            <a:schemeClr val="accent1"/>
+          </a:fillRef>
+          <a:effectRef idx="1">
+            <a:schemeClr val="accent1"/>
+          </a:effectRef>
+          <a:fontRef idx="minor">
+            <a:schemeClr val="tx1"/>
+          </a:fontRef>
+        </p:style>
+      </p:cxnSp>
+      <p:cxnSp>
+        <p:nvCxnSpPr>
+          <p:cNvPr id="47" name="Straight Arrow Connector 46">
+            <a:extLst>
+              <a:ext uri="{FF2B5EF4-FFF2-40B4-BE49-F238E27FC236}">
+                <a16:creationId xmlns:a16="http://schemas.microsoft.com/office/drawing/2014/main" id="{F51935C2-E3F9-2C57-5BBD-5950F58118BE}"/>
+              </a:ext>
+            </a:extLst>
+          </p:cNvPr>
+          <p:cNvCxnSpPr>
+            <a:cxnSpLocks/>
+          </p:cNvCxnSpPr>
+          <p:nvPr/>
+        </p:nvCxnSpPr>
+        <p:spPr>
+          <a:xfrm>
+            <a:off x="8405150" y="3959500"/>
+            <a:ext cx="0" cy="366553"/>
+          </a:xfrm>
+          <a:prstGeom prst="straightConnector1">
+            <a:avLst/>
+          </a:prstGeom>
+          <a:ln w="57150">
+            <a:solidFill>
+              <a:schemeClr val="tx1"/>
+            </a:solidFill>
+            <a:tailEnd type="triangle"/>
+          </a:ln>
+        </p:spPr>
+        <p:style>
+          <a:lnRef idx="2">
+            <a:schemeClr val="accent1"/>
+          </a:lnRef>
+          <a:fillRef idx="0">
+            <a:schemeClr val="accent1"/>
+          </a:fillRef>
+          <a:effectRef idx="1">
+            <a:schemeClr val="accent1"/>
+          </a:effectRef>
+          <a:fontRef idx="minor">
+            <a:schemeClr val="tx1"/>
+          </a:fontRef>
+        </p:style>
+      </p:cxnSp>
+      <p:cxnSp>
+        <p:nvCxnSpPr>
+          <p:cNvPr id="49" name="Straight Arrow Connector 48">
+            <a:extLst>
+              <a:ext uri="{FF2B5EF4-FFF2-40B4-BE49-F238E27FC236}">
+                <a16:creationId xmlns:a16="http://schemas.microsoft.com/office/drawing/2014/main" id="{D35D8B89-E817-1F0B-7F14-DFC1F91F1B09}"/>
+              </a:ext>
+            </a:extLst>
+          </p:cNvPr>
+          <p:cNvCxnSpPr>
+            <a:cxnSpLocks/>
+          </p:cNvCxnSpPr>
+          <p:nvPr/>
+        </p:nvCxnSpPr>
+        <p:spPr>
+          <a:xfrm>
+            <a:off x="8623139" y="3312773"/>
+            <a:ext cx="1354238" cy="183198"/>
+          </a:xfrm>
+          <a:prstGeom prst="straightConnector1">
+            <a:avLst/>
+          </a:prstGeom>
+          <a:ln w="57150">
+            <a:solidFill>
+              <a:schemeClr val="tx1"/>
+            </a:solidFill>
+            <a:tailEnd type="triangle"/>
+          </a:ln>
+        </p:spPr>
+        <p:style>
+          <a:lnRef idx="2">
+            <a:schemeClr val="accent1"/>
+          </a:lnRef>
+          <a:fillRef idx="0">
+            <a:schemeClr val="accent1"/>
+          </a:fillRef>
+          <a:effectRef idx="1">
+            <a:schemeClr val="accent1"/>
+          </a:effectRef>
+          <a:fontRef idx="minor">
+            <a:schemeClr val="tx1"/>
+          </a:fontRef>
+        </p:style>
+      </p:cxnSp>
+      <p:sp>
+        <p:nvSpPr>
+          <p:cNvPr id="62" name="TextBox 61">
+            <a:extLst>
+              <a:ext uri="{FF2B5EF4-FFF2-40B4-BE49-F238E27FC236}">
+                <a16:creationId xmlns:a16="http://schemas.microsoft.com/office/drawing/2014/main" id="{C1E2ABCA-BF7C-A32F-9E38-9DD90403F91E}"/>
+              </a:ext>
+            </a:extLst>
+          </p:cNvPr>
+          <p:cNvSpPr txBox="1"/>
+          <p:nvPr/>
+        </p:nvSpPr>
+        <p:spPr>
+          <a:xfrm>
+            <a:off x="9187507" y="2623841"/>
+            <a:ext cx="2330739" cy="400110"/>
+          </a:xfrm>
+          <a:prstGeom prst="rect">
+            <a:avLst/>
+          </a:prstGeom>
+          <a:noFill/>
+        </p:spPr>
+        <p:txBody>
+          <a:bodyPr wrap="square" rtlCol="0">
+            <a:spAutoFit/>
+          </a:bodyPr>
+          <a:lstStyle/>
+          <a:p>
+            <a:pPr algn="r"/>
+            <a:r>
+              <a:rPr lang="en-US" sz="2000" b="1" i="1" dirty="0">
+                <a:latin typeface="Verdana" panose="020B0604030504040204" pitchFamily="34" charset="0"/>
+                <a:ea typeface="Verdana" panose="020B0604030504040204" pitchFamily="34" charset="0"/>
+                <a:cs typeface="Verdana" panose="020B0604030504040204" pitchFamily="34" charset="0"/>
+              </a:rPr>
+              <a:t>KNOWLEDGE</a:t>
+            </a:r>
+          </a:p>
+        </p:txBody>
+      </p:sp>
+      <p:sp>
+        <p:nvSpPr>
+          <p:cNvPr id="63" name="TextBox 62">
+            <a:extLst>
+              <a:ext uri="{FF2B5EF4-FFF2-40B4-BE49-F238E27FC236}">
+                <a16:creationId xmlns:a16="http://schemas.microsoft.com/office/drawing/2014/main" id="{5BA6814B-FAD1-8785-0BC0-DCCA5AA06CD7}"/>
+              </a:ext>
+            </a:extLst>
+          </p:cNvPr>
+          <p:cNvSpPr txBox="1"/>
+          <p:nvPr/>
+        </p:nvSpPr>
+        <p:spPr>
+          <a:xfrm>
+            <a:off x="7852046" y="6411723"/>
+            <a:ext cx="3805098" cy="400110"/>
+          </a:xfrm>
+          <a:prstGeom prst="rect">
+            <a:avLst/>
+          </a:prstGeom>
+          <a:noFill/>
+        </p:spPr>
+        <p:txBody>
+          <a:bodyPr wrap="square" rtlCol="0">
+            <a:spAutoFit/>
+          </a:bodyPr>
+          <a:lstStyle/>
+          <a:p>
+            <a:pPr algn="r"/>
+            <a:r>
+              <a:rPr lang="en-US" sz="2000" b="1" i="1" dirty="0">
+                <a:latin typeface="Verdana" panose="020B0604030504040204" pitchFamily="34" charset="0"/>
+                <a:ea typeface="Verdana" panose="020B0604030504040204" pitchFamily="34" charset="0"/>
+                <a:cs typeface="Verdana" panose="020B0604030504040204" pitchFamily="34" charset="0"/>
+              </a:rPr>
+              <a:t>MACHINE LEARNING</a:t>
+            </a:r>
+          </a:p>
+        </p:txBody>
+      </p:sp>
+      <p:cxnSp>
+        <p:nvCxnSpPr>
+          <p:cNvPr id="64" name="Straight Arrow Connector 63">
+            <a:extLst>
+              <a:ext uri="{FF2B5EF4-FFF2-40B4-BE49-F238E27FC236}">
+                <a16:creationId xmlns:a16="http://schemas.microsoft.com/office/drawing/2014/main" id="{22EB3636-25F6-E87A-E654-9FBD7994B86E}"/>
+              </a:ext>
+            </a:extLst>
+          </p:cNvPr>
+          <p:cNvCxnSpPr>
+            <a:cxnSpLocks/>
+          </p:cNvCxnSpPr>
+          <p:nvPr/>
+        </p:nvCxnSpPr>
+        <p:spPr>
+          <a:xfrm flipH="1">
+            <a:off x="7792182" y="2514502"/>
+            <a:ext cx="1154835" cy="741484"/>
+          </a:xfrm>
+          <a:prstGeom prst="straightConnector1">
+            <a:avLst/>
+          </a:prstGeom>
+          <a:ln w="57150">
+            <a:solidFill>
+              <a:schemeClr val="tx1"/>
+            </a:solidFill>
+            <a:tailEnd type="triangle"/>
+          </a:ln>
+        </p:spPr>
+        <p:style>
+          <a:lnRef idx="2">
+            <a:schemeClr val="accent1"/>
+          </a:lnRef>
+          <a:fillRef idx="0">
+            <a:schemeClr val="accent1"/>
+          </a:fillRef>
+          <a:effectRef idx="1">
+            <a:schemeClr val="accent1"/>
+          </a:effectRef>
+          <a:fontRef idx="minor">
+            <a:schemeClr val="tx1"/>
+          </a:fontRef>
+        </p:style>
+      </p:cxnSp>
+    </p:spTree>
+    <p:extLst>
+      <p:ext uri="{BB962C8B-B14F-4D97-AF65-F5344CB8AC3E}">
+        <p14:creationId xmlns:p14="http://schemas.microsoft.com/office/powerpoint/2010/main" val="3425247662"/>
+      </p:ext>
+    </p:extLst>
+  </p:cSld>
+  <p:clrMapOvr>
+    <a:masterClrMapping/>
+  </p:clrMapOvr>
+</p:sld>
+</file>
+
 <file path=ppt/theme/theme1.xml><?xml version="1.0" encoding="utf-8"?>
 <a:theme xmlns:a="http://schemas.openxmlformats.org/drawingml/2006/main" name="Office Theme">
   <a:themeElements>

</xml_diff>